<commit_message>
Updated Slide base on latest code changes.
</commit_message>
<xml_diff>
--- a/Slide/Big Data Technology_BookReviewRatings.pptx
+++ b/Slide/Big Data Technology_BookReviewRatings.pptx
@@ -46,21 +46,22 @@
     <p:sldId id="291" r:id="rId41"/>
     <p:sldId id="292" r:id="rId42"/>
     <p:sldId id="293" r:id="rId43"/>
+    <p:sldId id="294" r:id="rId44"/>
   </p:sldIdLst>
   <p:sldSz cy="5143500" cx="9144000"/>
   <p:notesSz cx="6858000" cy="9144000"/>
   <p:embeddedFontLst>
     <p:embeddedFont>
       <p:font typeface="PT Sans Narrow"/>
-      <p:regular r:id="rId44"/>
-      <p:bold r:id="rId45"/>
+      <p:regular r:id="rId45"/>
+      <p:bold r:id="rId46"/>
     </p:embeddedFont>
     <p:embeddedFont>
       <p:font typeface="Open Sans"/>
-      <p:regular r:id="rId46"/>
-      <p:bold r:id="rId47"/>
-      <p:italic r:id="rId48"/>
-      <p:boldItalic r:id="rId49"/>
+      <p:regular r:id="rId47"/>
+      <p:bold r:id="rId48"/>
+      <p:italic r:id="rId49"/>
+      <p:boldItalic r:id="rId50"/>
     </p:embeddedFont>
   </p:embeddedFontLst>
   <p:defaultTextStyle>
@@ -3231,7 +3232,7 @@
       </p:grpSpPr>
       <p:sp>
         <p:nvSpPr>
-          <p:cNvPr id="286" name="Google Shape;286;ga02d01e0b6_0_287:notes"/>
+          <p:cNvPr id="286" name="Google Shape;286;g9c1f0646ad_0_0:notes"/>
           <p:cNvSpPr/>
           <p:nvPr>
             <p:ph idx="2" type="sldImg"/>
@@ -3266,7 +3267,7 @@
       </p:sp>
       <p:sp>
         <p:nvSpPr>
-          <p:cNvPr id="287" name="Google Shape;287;ga02d01e0b6_0_287:notes"/>
+          <p:cNvPr id="287" name="Google Shape;287;g9c1f0646ad_0_0:notes"/>
           <p:cNvSpPr txBox="1"/>
           <p:nvPr>
             <p:ph idx="1" type="body"/>
@@ -3316,7 +3317,7 @@
   <p:cSld>
     <p:spTree>
       <p:nvGrpSpPr>
-        <p:cNvPr id="291" name="Shape 291"/>
+        <p:cNvPr id="290" name="Shape 290"/>
         <p:cNvGrpSpPr/>
         <p:nvPr/>
       </p:nvGrpSpPr>
@@ -3330,7 +3331,7 @@
       </p:grpSpPr>
       <p:sp>
         <p:nvSpPr>
-          <p:cNvPr id="292" name="Google Shape;292;ga02d01e0b6_0_293:notes"/>
+          <p:cNvPr id="291" name="Google Shape;291;ga02d01e0b6_0_287:notes"/>
           <p:cNvSpPr/>
           <p:nvPr>
             <p:ph idx="2" type="sldImg"/>
@@ -3365,7 +3366,7 @@
       </p:sp>
       <p:sp>
         <p:nvSpPr>
-          <p:cNvPr id="293" name="Google Shape;293;ga02d01e0b6_0_293:notes"/>
+          <p:cNvPr id="292" name="Google Shape;292;ga02d01e0b6_0_287:notes"/>
           <p:cNvSpPr txBox="1"/>
           <p:nvPr>
             <p:ph idx="1" type="body"/>
@@ -3415,7 +3416,7 @@
   <p:cSld>
     <p:spTree>
       <p:nvGrpSpPr>
-        <p:cNvPr id="298" name="Shape 298"/>
+        <p:cNvPr id="296" name="Shape 296"/>
         <p:cNvGrpSpPr/>
         <p:nvPr/>
       </p:nvGrpSpPr>
@@ -3429,7 +3430,7 @@
       </p:grpSpPr>
       <p:sp>
         <p:nvSpPr>
-          <p:cNvPr id="299" name="Google Shape;299;ga02d01e0b6_0_299:notes"/>
+          <p:cNvPr id="297" name="Google Shape;297;ga02d01e0b6_0_293:notes"/>
           <p:cNvSpPr/>
           <p:nvPr>
             <p:ph idx="2" type="sldImg"/>
@@ -3464,7 +3465,7 @@
       </p:sp>
       <p:sp>
         <p:nvSpPr>
-          <p:cNvPr id="300" name="Google Shape;300;ga02d01e0b6_0_299:notes"/>
+          <p:cNvPr id="298" name="Google Shape;298;ga02d01e0b6_0_293:notes"/>
           <p:cNvSpPr txBox="1"/>
           <p:nvPr>
             <p:ph idx="1" type="body"/>
@@ -3514,7 +3515,7 @@
   <p:cSld>
     <p:spTree>
       <p:nvGrpSpPr>
-        <p:cNvPr id="305" name="Shape 305"/>
+        <p:cNvPr id="303" name="Shape 303"/>
         <p:cNvGrpSpPr/>
         <p:nvPr/>
       </p:nvGrpSpPr>
@@ -3528,7 +3529,7 @@
       </p:grpSpPr>
       <p:sp>
         <p:nvSpPr>
-          <p:cNvPr id="306" name="Google Shape;306;ga02d01e0b6_0_307:notes"/>
+          <p:cNvPr id="304" name="Google Shape;304;ga02d01e0b6_0_299:notes"/>
           <p:cNvSpPr/>
           <p:nvPr>
             <p:ph idx="2" type="sldImg"/>
@@ -3563,7 +3564,7 @@
       </p:sp>
       <p:sp>
         <p:nvSpPr>
-          <p:cNvPr id="307" name="Google Shape;307;ga02d01e0b6_0_307:notes"/>
+          <p:cNvPr id="305" name="Google Shape;305;ga02d01e0b6_0_299:notes"/>
           <p:cNvSpPr txBox="1"/>
           <p:nvPr>
             <p:ph idx="1" type="body"/>
@@ -3613,7 +3614,7 @@
   <p:cSld>
     <p:spTree>
       <p:nvGrpSpPr>
-        <p:cNvPr id="311" name="Shape 311"/>
+        <p:cNvPr id="310" name="Shape 310"/>
         <p:cNvGrpSpPr/>
         <p:nvPr/>
       </p:nvGrpSpPr>
@@ -3627,7 +3628,7 @@
       </p:grpSpPr>
       <p:sp>
         <p:nvSpPr>
-          <p:cNvPr id="312" name="Google Shape;312;ga02d01e0b6_0_315:notes"/>
+          <p:cNvPr id="311" name="Google Shape;311;ga02d01e0b6_0_307:notes"/>
           <p:cNvSpPr/>
           <p:nvPr>
             <p:ph idx="2" type="sldImg"/>
@@ -3662,7 +3663,7 @@
       </p:sp>
       <p:sp>
         <p:nvSpPr>
-          <p:cNvPr id="313" name="Google Shape;313;ga02d01e0b6_0_315:notes"/>
+          <p:cNvPr id="312" name="Google Shape;312;ga02d01e0b6_0_307:notes"/>
           <p:cNvSpPr txBox="1"/>
           <p:nvPr>
             <p:ph idx="1" type="body"/>
@@ -3712,7 +3713,7 @@
   <p:cSld>
     <p:spTree>
       <p:nvGrpSpPr>
-        <p:cNvPr id="318" name="Shape 318"/>
+        <p:cNvPr id="316" name="Shape 316"/>
         <p:cNvGrpSpPr/>
         <p:nvPr/>
       </p:nvGrpSpPr>
@@ -3726,7 +3727,7 @@
       </p:grpSpPr>
       <p:sp>
         <p:nvSpPr>
-          <p:cNvPr id="319" name="Google Shape;319;ga02d01e0b6_0_321:notes"/>
+          <p:cNvPr id="317" name="Google Shape;317;ga02d01e0b6_0_315:notes"/>
           <p:cNvSpPr/>
           <p:nvPr>
             <p:ph idx="2" type="sldImg"/>
@@ -3761,7 +3762,7 @@
       </p:sp>
       <p:sp>
         <p:nvSpPr>
-          <p:cNvPr id="320" name="Google Shape;320;ga02d01e0b6_0_321:notes"/>
+          <p:cNvPr id="318" name="Google Shape;318;ga02d01e0b6_0_315:notes"/>
           <p:cNvSpPr txBox="1"/>
           <p:nvPr>
             <p:ph idx="1" type="body"/>
@@ -3811,7 +3812,7 @@
   <p:cSld>
     <p:spTree>
       <p:nvGrpSpPr>
-        <p:cNvPr id="324" name="Shape 324"/>
+        <p:cNvPr id="323" name="Shape 323"/>
         <p:cNvGrpSpPr/>
         <p:nvPr/>
       </p:nvGrpSpPr>
@@ -3825,7 +3826,7 @@
       </p:grpSpPr>
       <p:sp>
         <p:nvSpPr>
-          <p:cNvPr id="325" name="Google Shape;325;ga02d01e0b6_0_327:notes"/>
+          <p:cNvPr id="324" name="Google Shape;324;ga02d01e0b6_0_321:notes"/>
           <p:cNvSpPr/>
           <p:nvPr>
             <p:ph idx="2" type="sldImg"/>
@@ -3860,7 +3861,106 @@
       </p:sp>
       <p:sp>
         <p:nvSpPr>
-          <p:cNvPr id="326" name="Google Shape;326;ga02d01e0b6_0_327:notes"/>
+          <p:cNvPr id="325" name="Google Shape;325;ga02d01e0b6_0_321:notes"/>
+          <p:cNvSpPr txBox="1"/>
+          <p:nvPr>
+            <p:ph idx="1" type="body"/>
+          </p:nvPr>
+        </p:nvSpPr>
+        <p:spPr>
+          <a:xfrm>
+            <a:off x="685800" y="4343400"/>
+            <a:ext cx="5486400" cy="4114800"/>
+          </a:xfrm>
+          <a:prstGeom prst="rect">
+            <a:avLst/>
+          </a:prstGeom>
+        </p:spPr>
+        <p:txBody>
+          <a:bodyPr anchorCtr="0" anchor="t" bIns="91425" lIns="91425" spcFirstLastPara="1" rIns="91425" wrap="square" tIns="91425">
+            <a:noAutofit/>
+          </a:bodyPr>
+          <a:lstStyle/>
+          <a:p>
+            <a:pPr indent="0" lvl="0" marL="0" rtl="0" algn="l">
+              <a:spcBef>
+                <a:spcPts val="0"/>
+              </a:spcBef>
+              <a:spcAft>
+                <a:spcPts val="0"/>
+              </a:spcAft>
+              <a:buNone/>
+            </a:pPr>
+            <a:r>
+              <a:t/>
+            </a:r>
+            <a:endParaRPr/>
+          </a:p>
+        </p:txBody>
+      </p:sp>
+    </p:spTree>
+  </p:cSld>
+  <p:clrMapOvr>
+    <a:masterClrMapping/>
+  </p:clrMapOvr>
+</p:notes>
+</file>
+
+<file path=ppt/notesSlides/notesSlide39.xml><?xml version="1.0" encoding="utf-8"?>
+<p:notes xmlns:a="http://schemas.openxmlformats.org/drawingml/2006/main" xmlns:r="http://schemas.openxmlformats.org/officeDocument/2006/relationships" xmlns:mc="http://schemas.openxmlformats.org/markup-compatibility/2006" xmlns:mv="urn:schemas-microsoft-com:mac:vml" xmlns:p="http://schemas.openxmlformats.org/presentationml/2006/main" xmlns:c="http://schemas.openxmlformats.org/drawingml/2006/chart" xmlns:dgm="http://schemas.openxmlformats.org/drawingml/2006/diagram" xmlns:o="urn:schemas-microsoft-com:office:office" xmlns:v="urn:schemas-microsoft-com:vml" xmlns:pvml="urn:schemas-microsoft-com:office:powerpoint" xmlns:com="http://schemas.openxmlformats.org/drawingml/2006/compatibility" xmlns:p14="http://schemas.microsoft.com/office/powerpoint/2010/main" xmlns:p15="http://schemas.microsoft.com/office/powerpoint/2012/main" xmlns:ahyp="http://schemas.microsoft.com/office/drawing/2018/hyperlinkcolor" showMasterPhAnim="0" showMasterSp="0">
+  <p:cSld>
+    <p:spTree>
+      <p:nvGrpSpPr>
+        <p:cNvPr id="328" name="Shape 328"/>
+        <p:cNvGrpSpPr/>
+        <p:nvPr/>
+      </p:nvGrpSpPr>
+      <p:grpSpPr>
+        <a:xfrm>
+          <a:off x="0" y="0"/>
+          <a:ext cx="0" cy="0"/>
+          <a:chOff x="0" y="0"/>
+          <a:chExt cx="0" cy="0"/>
+        </a:xfrm>
+      </p:grpSpPr>
+      <p:sp>
+        <p:nvSpPr>
+          <p:cNvPr id="329" name="Google Shape;329;ga02d01e0b6_0_327:notes"/>
+          <p:cNvSpPr/>
+          <p:nvPr>
+            <p:ph idx="2" type="sldImg"/>
+          </p:nvPr>
+        </p:nvSpPr>
+        <p:spPr>
+          <a:xfrm>
+            <a:off x="381300" y="685800"/>
+            <a:ext cx="6096000" cy="3429000"/>
+          </a:xfrm>
+          <a:custGeom>
+            <a:rect b="b" l="l" r="r" t="t"/>
+            <a:pathLst>
+              <a:path extrusionOk="0" h="120000" w="120000">
+                <a:moveTo>
+                  <a:pt x="0" y="0"/>
+                </a:moveTo>
+                <a:lnTo>
+                  <a:pt x="120000" y="0"/>
+                </a:lnTo>
+                <a:lnTo>
+                  <a:pt x="120000" y="120000"/>
+                </a:lnTo>
+                <a:lnTo>
+                  <a:pt x="0" y="120000"/>
+                </a:lnTo>
+                <a:close/>
+              </a:path>
+            </a:pathLst>
+          </a:custGeom>
+        </p:spPr>
+      </p:sp>
+      <p:sp>
+        <p:nvSpPr>
+          <p:cNvPr id="330" name="Google Shape;330;ga02d01e0b6_0_327:notes"/>
           <p:cNvSpPr txBox="1"/>
           <p:nvPr>
             <p:ph idx="1" type="body"/>
@@ -10182,8 +10282,8 @@
         </p:blipFill>
         <p:spPr>
           <a:xfrm>
-            <a:off x="413975" y="1772376"/>
-            <a:ext cx="8142748" cy="2282525"/>
+            <a:off x="394525" y="1898275"/>
+            <a:ext cx="8437774" cy="2092419"/>
           </a:xfrm>
           <a:prstGeom prst="rect">
             <a:avLst/>
@@ -10404,8 +10504,8 @@
         </p:blipFill>
         <p:spPr>
           <a:xfrm>
-            <a:off x="472525" y="2571750"/>
-            <a:ext cx="7219950" cy="1600200"/>
+            <a:off x="877575" y="2243525"/>
+            <a:ext cx="4933950" cy="2190750"/>
           </a:xfrm>
           <a:prstGeom prst="rect">
             <a:avLst/>
@@ -10827,8 +10927,8 @@
         </p:blipFill>
         <p:spPr>
           <a:xfrm>
-            <a:off x="431350" y="2480663"/>
-            <a:ext cx="6381750" cy="1628775"/>
+            <a:off x="870025" y="2489600"/>
+            <a:ext cx="5124450" cy="1771650"/>
           </a:xfrm>
           <a:prstGeom prst="rect">
             <a:avLst/>
@@ -15065,120 +15165,13 @@
             </a:pPr>
             <a:r>
               <a:rPr lang="en"/>
-              <a:t>Apache Kafka</a:t>
-            </a:r>
-            <a:endParaRPr/>
-          </a:p>
-          <a:p>
-            <a:pPr indent="0" lvl="0" marL="0" rtl="0" algn="l">
-              <a:spcBef>
-                <a:spcPts val="0"/>
-              </a:spcBef>
-              <a:spcAft>
-                <a:spcPts val="0"/>
-              </a:spcAft>
-              <a:buNone/>
-            </a:pPr>
-            <a:r>
-              <a:t/>
-            </a:r>
-            <a:endParaRPr/>
-          </a:p>
-        </p:txBody>
-      </p:sp>
-      <p:sp>
-        <p:nvSpPr>
-          <p:cNvPr id="290" name="Google Shape;290;p44"/>
-          <p:cNvSpPr txBox="1"/>
-          <p:nvPr>
-            <p:ph idx="1" type="body"/>
-          </p:nvPr>
-        </p:nvSpPr>
-        <p:spPr>
-          <a:xfrm>
-            <a:off x="194800" y="1182800"/>
-            <a:ext cx="8484900" cy="3661200"/>
-          </a:xfrm>
-          <a:prstGeom prst="rect">
-            <a:avLst/>
-          </a:prstGeom>
-        </p:spPr>
-        <p:txBody>
-          <a:bodyPr anchorCtr="0" anchor="t" bIns="91425" lIns="91425" spcFirstLastPara="1" rIns="91425" wrap="square" tIns="91425">
-            <a:noAutofit/>
-          </a:bodyPr>
-          <a:lstStyle/>
-          <a:p>
-            <a:pPr indent="-342900" lvl="0" marL="457200" rtl="0" algn="l">
-              <a:spcBef>
-                <a:spcPts val="0"/>
-              </a:spcBef>
-              <a:spcAft>
-                <a:spcPts val="0"/>
-              </a:spcAft>
-              <a:buSzPts val="1800"/>
-              <a:buChar char="●"/>
-            </a:pPr>
+              <a:t>Project</a:t>
+            </a:r>
             <a:r>
               <a:rPr lang="en"/>
-              <a:t>It is distributed message system between publisher and subscriber.</a:t>
-            </a:r>
-            <a:endParaRPr/>
-          </a:p>
-          <a:p>
-            <a:pPr indent="-342900" lvl="0" marL="457200" rtl="0" algn="l">
-              <a:lnSpc>
-                <a:spcPct val="115000"/>
-              </a:lnSpc>
-              <a:spcBef>
-                <a:spcPts val="0"/>
-              </a:spcBef>
-              <a:spcAft>
-                <a:spcPts val="0"/>
-              </a:spcAft>
-              <a:buSzPts val="1800"/>
-              <a:buChar char="●"/>
-            </a:pPr>
-            <a:r>
-              <a:rPr lang="en"/>
-              <a:t>Handles high volume of data of message between publishers and subscribers. </a:t>
-            </a:r>
-            <a:endParaRPr/>
-          </a:p>
-          <a:p>
-            <a:pPr indent="-342900" lvl="0" marL="457200" rtl="0" algn="l">
-              <a:lnSpc>
-                <a:spcPct val="115000"/>
-              </a:lnSpc>
-              <a:spcBef>
-                <a:spcPts val="0"/>
-              </a:spcBef>
-              <a:spcAft>
-                <a:spcPts val="0"/>
-              </a:spcAft>
-              <a:buSzPts val="1800"/>
-              <a:buChar char="●"/>
-            </a:pPr>
-            <a:r>
-              <a:rPr lang="en"/>
-              <a:t>Can be used with offline and online message consumption. </a:t>
-            </a:r>
-            <a:endParaRPr/>
-          </a:p>
-          <a:p>
-            <a:pPr indent="0" lvl="0" marL="0" rtl="0" algn="l">
-              <a:spcBef>
-                <a:spcPts val="1600"/>
-              </a:spcBef>
-              <a:spcAft>
-                <a:spcPts val="1600"/>
-              </a:spcAft>
-              <a:buNone/>
-            </a:pPr>
-            <a:r>
-              <a:t/>
-            </a:r>
-            <a:endParaRPr b="1"/>
+              <a:t> Demo</a:t>
+            </a:r>
+            <a:endParaRPr/>
           </a:p>
         </p:txBody>
       </p:sp>
@@ -15195,7 +15188,7 @@
   <p:cSld>
     <p:spTree>
       <p:nvGrpSpPr>
-        <p:cNvPr id="294" name="Shape 294"/>
+        <p:cNvPr id="293" name="Shape 293"/>
         <p:cNvGrpSpPr/>
         <p:nvPr/>
       </p:nvGrpSpPr>
@@ -15209,7 +15202,7 @@
       </p:grpSpPr>
       <p:sp>
         <p:nvSpPr>
-          <p:cNvPr id="295" name="Google Shape;295;p45"/>
+          <p:cNvPr id="294" name="Google Shape;294;p45"/>
           <p:cNvSpPr txBox="1"/>
           <p:nvPr>
             <p:ph type="title"/>
@@ -15241,7 +15234,22 @@
             </a:pPr>
             <a:r>
               <a:rPr lang="en"/>
-              <a:t>Apache Kafka - Commands</a:t>
+              <a:t>Apache Kafka</a:t>
+            </a:r>
+            <a:endParaRPr/>
+          </a:p>
+          <a:p>
+            <a:pPr indent="0" lvl="0" marL="0" rtl="0" algn="l">
+              <a:spcBef>
+                <a:spcPts val="0"/>
+              </a:spcBef>
+              <a:spcAft>
+                <a:spcPts val="0"/>
+              </a:spcAft>
+              <a:buNone/>
+            </a:pPr>
+            <a:r>
+              <a:t/>
             </a:r>
             <a:endParaRPr/>
           </a:p>
@@ -15249,7 +15257,7 @@
       </p:sp>
       <p:sp>
         <p:nvSpPr>
-          <p:cNvPr id="296" name="Google Shape;296;p45"/>
+          <p:cNvPr id="295" name="Google Shape;295;p45"/>
           <p:cNvSpPr txBox="1"/>
           <p:nvPr>
             <p:ph idx="1" type="body"/>
@@ -15270,82 +15278,79 @@
           </a:bodyPr>
           <a:lstStyle/>
           <a:p>
-            <a:pPr indent="0" lvl="0" marL="0" rtl="0" algn="l">
-              <a:spcBef>
-                <a:spcPts val="0"/>
-              </a:spcBef>
-              <a:spcAft>
-                <a:spcPts val="0"/>
-              </a:spcAft>
-              <a:buNone/>
-            </a:pPr>
-            <a:r>
-              <a:rPr b="1" lang="en"/>
-              <a:t>Start Kafka Service:</a:t>
+            <a:pPr indent="-342900" lvl="0" marL="457200" rtl="0" algn="l">
+              <a:spcBef>
+                <a:spcPts val="0"/>
+              </a:spcBef>
+              <a:spcAft>
+                <a:spcPts val="0"/>
+              </a:spcAft>
+              <a:buSzPts val="1800"/>
+              <a:buChar char="●"/>
+            </a:pPr>
+            <a:r>
+              <a:rPr lang="en"/>
+              <a:t>It is distributed message system between publisher and subscriber.</a:t>
+            </a:r>
+            <a:endParaRPr/>
+          </a:p>
+          <a:p>
+            <a:pPr indent="-342900" lvl="0" marL="457200" rtl="0" algn="l">
+              <a:lnSpc>
+                <a:spcPct val="115000"/>
+              </a:lnSpc>
+              <a:spcBef>
+                <a:spcPts val="0"/>
+              </a:spcBef>
+              <a:spcAft>
+                <a:spcPts val="0"/>
+              </a:spcAft>
+              <a:buSzPts val="1800"/>
+              <a:buChar char="●"/>
+            </a:pPr>
+            <a:r>
+              <a:rPr lang="en"/>
+              <a:t>Handles high volume of data of message between publishers and subscribers. </a:t>
+            </a:r>
+            <a:endParaRPr/>
+          </a:p>
+          <a:p>
+            <a:pPr indent="-342900" lvl="0" marL="457200" rtl="0" algn="l">
+              <a:lnSpc>
+                <a:spcPct val="115000"/>
+              </a:lnSpc>
+              <a:spcBef>
+                <a:spcPts val="0"/>
+              </a:spcBef>
+              <a:spcAft>
+                <a:spcPts val="0"/>
+              </a:spcAft>
+              <a:buSzPts val="1800"/>
+              <a:buChar char="●"/>
+            </a:pPr>
+            <a:r>
+              <a:rPr lang="en"/>
+              <a:t>Can be used with offline and online message consumption. </a:t>
+            </a:r>
+            <a:endParaRPr/>
+          </a:p>
+          <a:p>
+            <a:pPr indent="0" lvl="0" marL="0" rtl="0" algn="l">
+              <a:spcBef>
+                <a:spcPts val="1600"/>
+              </a:spcBef>
+              <a:spcAft>
+                <a:spcPts val="1600"/>
+              </a:spcAft>
+              <a:buNone/>
+            </a:pPr>
+            <a:r>
+              <a:t/>
             </a:r>
             <a:endParaRPr b="1"/>
           </a:p>
-          <a:p>
-            <a:pPr indent="0" lvl="0" marL="0" rtl="0" algn="l">
-              <a:spcBef>
-                <a:spcPts val="1600"/>
-              </a:spcBef>
-              <a:spcAft>
-                <a:spcPts val="0"/>
-              </a:spcAft>
-              <a:buNone/>
-            </a:pPr>
-            <a:r>
-              <a:rPr lang="en"/>
-              <a:t>&gt; sudo service kafka-server start</a:t>
-            </a:r>
-            <a:endParaRPr/>
-          </a:p>
-          <a:p>
-            <a:pPr indent="0" lvl="0" marL="0" rtl="0" algn="l">
-              <a:spcBef>
-                <a:spcPts val="1600"/>
-              </a:spcBef>
-              <a:spcAft>
-                <a:spcPts val="1600"/>
-              </a:spcAft>
-              <a:buNone/>
-            </a:pPr>
-            <a:r>
-              <a:t/>
-            </a:r>
-            <a:endParaRPr/>
-          </a:p>
         </p:txBody>
       </p:sp>
-      <p:pic>
-        <p:nvPicPr>
-          <p:cNvPr id="297" name="Google Shape;297;p45"/>
-          <p:cNvPicPr preferRelativeResize="0"/>
-          <p:nvPr/>
-        </p:nvPicPr>
-        <p:blipFill>
-          <a:blip r:embed="rId3">
-            <a:alphaModFix/>
-          </a:blip>
-          <a:stretch>
-            <a:fillRect/>
-          </a:stretch>
-        </p:blipFill>
-        <p:spPr>
-          <a:xfrm>
-            <a:off x="281338" y="2332363"/>
-            <a:ext cx="6257925" cy="1362075"/>
-          </a:xfrm>
-          <a:prstGeom prst="rect">
-            <a:avLst/>
-          </a:prstGeom>
-          <a:noFill/>
-          <a:ln>
-            <a:noFill/>
-          </a:ln>
-        </p:spPr>
-      </p:pic>
     </p:spTree>
   </p:cSld>
   <p:clrMapOvr>
@@ -15359,7 +15364,7 @@
   <p:cSld>
     <p:spTree>
       <p:nvGrpSpPr>
-        <p:cNvPr id="301" name="Shape 301"/>
+        <p:cNvPr id="299" name="Shape 299"/>
         <p:cNvGrpSpPr/>
         <p:nvPr/>
       </p:nvGrpSpPr>
@@ -15373,7 +15378,7 @@
       </p:grpSpPr>
       <p:sp>
         <p:nvSpPr>
-          <p:cNvPr id="302" name="Google Shape;302;p46"/>
+          <p:cNvPr id="300" name="Google Shape;300;p46"/>
           <p:cNvSpPr txBox="1"/>
           <p:nvPr>
             <p:ph type="title"/>
@@ -15405,7 +15410,7 @@
             </a:pPr>
             <a:r>
               <a:rPr lang="en"/>
-              <a:t>Apache Kafka - Commands - Cont.</a:t>
+              <a:t>Apache Kafka - Commands</a:t>
             </a:r>
             <a:endParaRPr/>
           </a:p>
@@ -15413,7 +15418,7 @@
       </p:sp>
       <p:sp>
         <p:nvSpPr>
-          <p:cNvPr id="303" name="Google Shape;303;p46"/>
+          <p:cNvPr id="301" name="Google Shape;301;p46"/>
           <p:cNvSpPr txBox="1"/>
           <p:nvPr>
             <p:ph idx="1" type="body"/>
@@ -15445,7 +15450,7 @@
             </a:pPr>
             <a:r>
               <a:rPr b="1" lang="en"/>
-              <a:t>Start create topic:</a:t>
+              <a:t>Start Kafka Service:</a:t>
             </a:r>
             <a:endParaRPr b="1"/>
           </a:p>
@@ -15461,29 +15466,9 @@
             </a:pPr>
             <a:r>
               <a:rPr lang="en"/>
-              <a:t>&gt; </a:t>
-            </a:r>
-            <a:r>
-              <a:rPr lang="en" sz="1500">
-                <a:solidFill>
-                  <a:srgbClr val="000000"/>
-                </a:solidFill>
-                <a:latin typeface="Calibri"/>
-                <a:ea typeface="Calibri"/>
-                <a:cs typeface="Calibri"/>
-                <a:sym typeface="Calibri"/>
-              </a:rPr>
-              <a:t>kafka-topics --create -zookeeper localhost:2181 --replication-factor 1 --partitions 1 --topic Hello-Kafka</a:t>
-            </a:r>
-            <a:endParaRPr sz="1500">
-              <a:solidFill>
-                <a:srgbClr val="000000"/>
-              </a:solidFill>
-              <a:latin typeface="Calibri"/>
-              <a:ea typeface="Calibri"/>
-              <a:cs typeface="Calibri"/>
-              <a:sym typeface="Calibri"/>
-            </a:endParaRPr>
+              <a:t>&gt; sudo service kafka-server start</a:t>
+            </a:r>
+            <a:endParaRPr/>
           </a:p>
           <a:p>
             <a:pPr indent="0" lvl="0" marL="0" rtl="0" algn="l">
@@ -15504,7 +15489,7 @@
       </p:sp>
       <p:pic>
         <p:nvPicPr>
-          <p:cNvPr id="304" name="Google Shape;304;p46"/>
+          <p:cNvPr id="302" name="Google Shape;302;p46"/>
           <p:cNvPicPr preferRelativeResize="0"/>
           <p:nvPr/>
         </p:nvPicPr>
@@ -15518,8 +15503,8 @@
         </p:blipFill>
         <p:spPr>
           <a:xfrm>
-            <a:off x="311700" y="2260200"/>
-            <a:ext cx="5490124" cy="2445600"/>
+            <a:off x="281338" y="2332363"/>
+            <a:ext cx="6257925" cy="1362075"/>
           </a:xfrm>
           <a:prstGeom prst="rect">
             <a:avLst/>
@@ -15543,7 +15528,7 @@
   <p:cSld>
     <p:spTree>
       <p:nvGrpSpPr>
-        <p:cNvPr id="308" name="Shape 308"/>
+        <p:cNvPr id="306" name="Shape 306"/>
         <p:cNvGrpSpPr/>
         <p:nvPr/>
       </p:nvGrpSpPr>
@@ -15557,7 +15542,7 @@
       </p:grpSpPr>
       <p:sp>
         <p:nvSpPr>
-          <p:cNvPr id="309" name="Google Shape;309;p47"/>
+          <p:cNvPr id="307" name="Google Shape;307;p47"/>
           <p:cNvSpPr txBox="1"/>
           <p:nvPr>
             <p:ph type="title"/>
@@ -15597,7 +15582,7 @@
       </p:sp>
       <p:sp>
         <p:nvSpPr>
-          <p:cNvPr id="310" name="Google Shape;310;p47"/>
+          <p:cNvPr id="308" name="Google Shape;308;p47"/>
           <p:cNvSpPr txBox="1"/>
           <p:nvPr>
             <p:ph idx="1" type="body"/>
@@ -15629,11 +15614,7 @@
             </a:pPr>
             <a:r>
               <a:rPr b="1" lang="en"/>
-              <a:t>Start producer for topic Hello-Kafka</a:t>
-            </a:r>
-            <a:r>
-              <a:rPr b="1" lang="en"/>
-              <a:t>:</a:t>
+              <a:t>Start create topic:</a:t>
             </a:r>
             <a:endParaRPr b="1"/>
           </a:p>
@@ -15652,7 +15633,7 @@
               <a:t>&gt; </a:t>
             </a:r>
             <a:r>
-              <a:rPr lang="en" sz="1700">
+              <a:rPr lang="en" sz="1500">
                 <a:solidFill>
                   <a:srgbClr val="000000"/>
                 </a:solidFill>
@@ -15661,30 +15642,7 @@
                 <a:cs typeface="Calibri"/>
                 <a:sym typeface="Calibri"/>
               </a:rPr>
-              <a:t>kafka-console-producer --broker-list localhost:9092 --topic Hello-Kafka</a:t>
-            </a:r>
-            <a:endParaRPr sz="1700">
-              <a:solidFill>
-                <a:srgbClr val="000000"/>
-              </a:solidFill>
-              <a:latin typeface="Calibri"/>
-              <a:ea typeface="Calibri"/>
-              <a:cs typeface="Calibri"/>
-              <a:sym typeface="Calibri"/>
-            </a:endParaRPr>
-          </a:p>
-          <a:p>
-            <a:pPr indent="0" lvl="0" marL="0" rtl="0" algn="l">
-              <a:spcBef>
-                <a:spcPts val="1600"/>
-              </a:spcBef>
-              <a:spcAft>
-                <a:spcPts val="0"/>
-              </a:spcAft>
-              <a:buNone/>
-            </a:pPr>
-            <a:r>
-              <a:t/>
+              <a:t>kafka-topics --create -zookeeper localhost:2181 --replication-factor 1 --partitions 1 --topic Hello-Kafka</a:t>
             </a:r>
             <a:endParaRPr sz="1500">
               <a:solidFill>
@@ -15702,46 +15660,45 @@
                 <a:spcPts val="1600"/>
               </a:spcBef>
               <a:spcAft>
-                <a:spcPts val="0"/>
-              </a:spcAft>
-              <a:buNone/>
-            </a:pPr>
-            <a:r>
-              <a:rPr b="1" lang="en"/>
-              <a:t>Start consumer for topic Hello-Kafka:</a:t>
-            </a:r>
-            <a:endParaRPr b="1"/>
-          </a:p>
-          <a:p>
-            <a:pPr indent="0" lvl="0" marL="0" rtl="0" algn="l">
-              <a:spcBef>
-                <a:spcPts val="1600"/>
-              </a:spcBef>
-              <a:spcAft>
-                <a:spcPts val="1600"/>
-              </a:spcAft>
-              <a:buNone/>
-            </a:pPr>
-            <a:r>
-              <a:rPr lang="en"/>
-              <a:t>&gt; </a:t>
-            </a:r>
-            <a:r>
-              <a:rPr lang="en" sz="1700">
-                <a:solidFill>
-                  <a:srgbClr val="000000"/>
-                </a:solidFill>
-                <a:latin typeface="Calibri"/>
-                <a:ea typeface="Calibri"/>
-                <a:cs typeface="Calibri"/>
-                <a:sym typeface="Calibri"/>
-              </a:rPr>
-              <a:t>kafka-console-consumer --zookeeper localhost:2181 --topic Hello-Kafka --from-beginning</a:t>
-            </a:r>
-            <a:endParaRPr sz="2300"/>
+                <a:spcPts val="1600"/>
+              </a:spcAft>
+              <a:buNone/>
+            </a:pPr>
+            <a:r>
+              <a:t/>
+            </a:r>
+            <a:endParaRPr/>
           </a:p>
         </p:txBody>
       </p:sp>
+      <p:pic>
+        <p:nvPicPr>
+          <p:cNvPr id="309" name="Google Shape;309;p47"/>
+          <p:cNvPicPr preferRelativeResize="0"/>
+          <p:nvPr/>
+        </p:nvPicPr>
+        <p:blipFill>
+          <a:blip r:embed="rId3">
+            <a:alphaModFix/>
+          </a:blip>
+          <a:stretch>
+            <a:fillRect/>
+          </a:stretch>
+        </p:blipFill>
+        <p:spPr>
+          <a:xfrm>
+            <a:off x="311700" y="2260200"/>
+            <a:ext cx="5490124" cy="2445600"/>
+          </a:xfrm>
+          <a:prstGeom prst="rect">
+            <a:avLst/>
+          </a:prstGeom>
+          <a:noFill/>
+          <a:ln>
+            <a:noFill/>
+          </a:ln>
+        </p:spPr>
+      </p:pic>
     </p:spTree>
   </p:cSld>
   <p:clrMapOvr>
@@ -15755,7 +15712,7 @@
   <p:cSld>
     <p:spTree>
       <p:nvGrpSpPr>
-        <p:cNvPr id="314" name="Shape 314"/>
+        <p:cNvPr id="313" name="Shape 313"/>
         <p:cNvGrpSpPr/>
         <p:nvPr/>
       </p:nvGrpSpPr>
@@ -15769,7 +15726,7 @@
       </p:grpSpPr>
       <p:sp>
         <p:nvSpPr>
-          <p:cNvPr id="315" name="Google Shape;315;p48"/>
+          <p:cNvPr id="314" name="Google Shape;314;p48"/>
           <p:cNvSpPr txBox="1"/>
           <p:nvPr>
             <p:ph type="title"/>
@@ -15809,7 +15766,7 @@
       </p:sp>
       <p:sp>
         <p:nvSpPr>
-          <p:cNvPr id="316" name="Google Shape;316;p48"/>
+          <p:cNvPr id="315" name="Google Shape;315;p48"/>
           <p:cNvSpPr txBox="1"/>
           <p:nvPr>
             <p:ph idx="1" type="body"/>
@@ -15841,7 +15798,11 @@
             </a:pPr>
             <a:r>
               <a:rPr b="1" lang="en"/>
-              <a:t>Screenshots between Producer and Consumer</a:t>
+              <a:t>Start producer for topic Hello-Kafka</a:t>
+            </a:r>
+            <a:r>
+              <a:rPr b="1" lang="en"/>
+              <a:t>:</a:t>
             </a:r>
             <a:endParaRPr b="1"/>
           </a:p>
@@ -15851,45 +15812,105 @@
                 <a:spcPts val="1600"/>
               </a:spcBef>
               <a:spcAft>
-                <a:spcPts val="1600"/>
+                <a:spcPts val="0"/>
+              </a:spcAft>
+              <a:buNone/>
+            </a:pPr>
+            <a:r>
+              <a:rPr lang="en"/>
+              <a:t>&gt; </a:t>
+            </a:r>
+            <a:r>
+              <a:rPr lang="en" sz="1700">
+                <a:solidFill>
+                  <a:srgbClr val="000000"/>
+                </a:solidFill>
+                <a:latin typeface="Calibri"/>
+                <a:ea typeface="Calibri"/>
+                <a:cs typeface="Calibri"/>
+                <a:sym typeface="Calibri"/>
+              </a:rPr>
+              <a:t>kafka-console-producer --broker-list localhost:9092 --topic Hello-Kafka</a:t>
+            </a:r>
+            <a:endParaRPr sz="1700">
+              <a:solidFill>
+                <a:srgbClr val="000000"/>
+              </a:solidFill>
+              <a:latin typeface="Calibri"/>
+              <a:ea typeface="Calibri"/>
+              <a:cs typeface="Calibri"/>
+              <a:sym typeface="Calibri"/>
+            </a:endParaRPr>
+          </a:p>
+          <a:p>
+            <a:pPr indent="0" lvl="0" marL="0" rtl="0" algn="l">
+              <a:spcBef>
+                <a:spcPts val="1600"/>
+              </a:spcBef>
+              <a:spcAft>
+                <a:spcPts val="0"/>
               </a:spcAft>
               <a:buNone/>
             </a:pPr>
             <a:r>
               <a:t/>
             </a:r>
+            <a:endParaRPr sz="1500">
+              <a:solidFill>
+                <a:srgbClr val="000000"/>
+              </a:solidFill>
+              <a:latin typeface="Calibri"/>
+              <a:ea typeface="Calibri"/>
+              <a:cs typeface="Calibri"/>
+              <a:sym typeface="Calibri"/>
+            </a:endParaRPr>
+          </a:p>
+          <a:p>
+            <a:pPr indent="0" lvl="0" marL="0" rtl="0" algn="l">
+              <a:spcBef>
+                <a:spcPts val="1600"/>
+              </a:spcBef>
+              <a:spcAft>
+                <a:spcPts val="0"/>
+              </a:spcAft>
+              <a:buNone/>
+            </a:pPr>
+            <a:r>
+              <a:rPr b="1" lang="en"/>
+              <a:t>Start consumer for topic Hello-Kafka:</a:t>
+            </a:r>
             <a:endParaRPr b="1"/>
           </a:p>
+          <a:p>
+            <a:pPr indent="0" lvl="0" marL="0" rtl="0" algn="l">
+              <a:spcBef>
+                <a:spcPts val="1600"/>
+              </a:spcBef>
+              <a:spcAft>
+                <a:spcPts val="1600"/>
+              </a:spcAft>
+              <a:buNone/>
+            </a:pPr>
+            <a:r>
+              <a:rPr lang="en"/>
+              <a:t>&gt; </a:t>
+            </a:r>
+            <a:r>
+              <a:rPr lang="en" sz="1700">
+                <a:solidFill>
+                  <a:srgbClr val="000000"/>
+                </a:solidFill>
+                <a:latin typeface="Calibri"/>
+                <a:ea typeface="Calibri"/>
+                <a:cs typeface="Calibri"/>
+                <a:sym typeface="Calibri"/>
+              </a:rPr>
+              <a:t>kafka-console-consumer --zookeeper localhost:2181 --topic Hello-Kafka --from-beginning</a:t>
+            </a:r>
+            <a:endParaRPr sz="2300"/>
+          </a:p>
         </p:txBody>
       </p:sp>
-      <p:pic>
-        <p:nvPicPr>
-          <p:cNvPr id="317" name="Google Shape;317;p48"/>
-          <p:cNvPicPr preferRelativeResize="0"/>
-          <p:nvPr/>
-        </p:nvPicPr>
-        <p:blipFill>
-          <a:blip r:embed="rId3">
-            <a:alphaModFix/>
-          </a:blip>
-          <a:stretch>
-            <a:fillRect/>
-          </a:stretch>
-        </p:blipFill>
-        <p:spPr>
-          <a:xfrm>
-            <a:off x="253225" y="1835826"/>
-            <a:ext cx="8106599" cy="2781625"/>
-          </a:xfrm>
-          <a:prstGeom prst="rect">
-            <a:avLst/>
-          </a:prstGeom>
-          <a:noFill/>
-          <a:ln>
-            <a:noFill/>
-          </a:ln>
-        </p:spPr>
-      </p:pic>
     </p:spTree>
   </p:cSld>
   <p:clrMapOvr>
@@ -15903,7 +15924,7 @@
   <p:cSld>
     <p:spTree>
       <p:nvGrpSpPr>
-        <p:cNvPr id="321" name="Shape 321"/>
+        <p:cNvPr id="319" name="Shape 319"/>
         <p:cNvGrpSpPr/>
         <p:nvPr/>
       </p:nvGrpSpPr>
@@ -15917,7 +15938,7 @@
       </p:grpSpPr>
       <p:sp>
         <p:nvSpPr>
-          <p:cNvPr id="322" name="Google Shape;322;p49"/>
+          <p:cNvPr id="320" name="Google Shape;320;p49"/>
           <p:cNvSpPr txBox="1"/>
           <p:nvPr>
             <p:ph type="title"/>
@@ -15949,7 +15970,7 @@
             </a:pPr>
             <a:r>
               <a:rPr lang="en"/>
-              <a:t>Demonstration</a:t>
+              <a:t>Apache Kafka - Commands - Cont.</a:t>
             </a:r>
             <a:endParaRPr/>
           </a:p>
@@ -15957,7 +15978,7 @@
       </p:sp>
       <p:sp>
         <p:nvSpPr>
-          <p:cNvPr id="323" name="Google Shape;323;p49"/>
+          <p:cNvPr id="321" name="Google Shape;321;p49"/>
           <p:cNvSpPr txBox="1"/>
           <p:nvPr>
             <p:ph idx="1" type="body"/>
@@ -15983,6 +16004,22 @@
                 <a:spcPts val="0"/>
               </a:spcBef>
               <a:spcAft>
+                <a:spcPts val="0"/>
+              </a:spcAft>
+              <a:buNone/>
+            </a:pPr>
+            <a:r>
+              <a:rPr b="1" lang="en"/>
+              <a:t>Screenshots between Producer and Consumer</a:t>
+            </a:r>
+            <a:endParaRPr b="1"/>
+          </a:p>
+          <a:p>
+            <a:pPr indent="0" lvl="0" marL="0" rtl="0" algn="l">
+              <a:spcBef>
+                <a:spcPts val="1600"/>
+              </a:spcBef>
+              <a:spcAft>
                 <a:spcPts val="1600"/>
               </a:spcAft>
               <a:buNone/>
@@ -15994,6 +16031,34 @@
           </a:p>
         </p:txBody>
       </p:sp>
+      <p:pic>
+        <p:nvPicPr>
+          <p:cNvPr id="322" name="Google Shape;322;p49"/>
+          <p:cNvPicPr preferRelativeResize="0"/>
+          <p:nvPr/>
+        </p:nvPicPr>
+        <p:blipFill>
+          <a:blip r:embed="rId3">
+            <a:alphaModFix/>
+          </a:blip>
+          <a:stretch>
+            <a:fillRect/>
+          </a:stretch>
+        </p:blipFill>
+        <p:spPr>
+          <a:xfrm>
+            <a:off x="253225" y="1835826"/>
+            <a:ext cx="8106599" cy="2781625"/>
+          </a:xfrm>
+          <a:prstGeom prst="rect">
+            <a:avLst/>
+          </a:prstGeom>
+          <a:noFill/>
+          <a:ln>
+            <a:noFill/>
+          </a:ln>
+        </p:spPr>
+      </p:pic>
     </p:spTree>
   </p:cSld>
   <p:clrMapOvr>
@@ -16007,7 +16072,7 @@
   <p:cSld>
     <p:spTree>
       <p:nvGrpSpPr>
-        <p:cNvPr id="327" name="Shape 327"/>
+        <p:cNvPr id="326" name="Shape 326"/>
         <p:cNvGrpSpPr/>
         <p:nvPr/>
       </p:nvGrpSpPr>
@@ -16021,7 +16086,72 @@
       </p:grpSpPr>
       <p:sp>
         <p:nvSpPr>
-          <p:cNvPr id="328" name="Google Shape;328;p50"/>
+          <p:cNvPr id="327" name="Google Shape;327;p50"/>
+          <p:cNvSpPr txBox="1"/>
+          <p:nvPr>
+            <p:ph type="title"/>
+          </p:nvPr>
+        </p:nvSpPr>
+        <p:spPr>
+          <a:xfrm>
+            <a:off x="311700" y="445025"/>
+            <a:ext cx="8520600" cy="707400"/>
+          </a:xfrm>
+          <a:prstGeom prst="rect">
+            <a:avLst/>
+          </a:prstGeom>
+        </p:spPr>
+        <p:txBody>
+          <a:bodyPr anchorCtr="0" anchor="t" bIns="91425" lIns="91425" spcFirstLastPara="1" rIns="91425" wrap="square" tIns="91425">
+            <a:noAutofit/>
+          </a:bodyPr>
+          <a:lstStyle/>
+          <a:p>
+            <a:pPr indent="0" lvl="0" marL="0" rtl="0" algn="l">
+              <a:spcBef>
+                <a:spcPts val="0"/>
+              </a:spcBef>
+              <a:spcAft>
+                <a:spcPts val="0"/>
+              </a:spcAft>
+              <a:buNone/>
+            </a:pPr>
+            <a:r>
+              <a:rPr lang="en"/>
+              <a:t>Kafka Demo</a:t>
+            </a:r>
+            <a:endParaRPr/>
+          </a:p>
+        </p:txBody>
+      </p:sp>
+    </p:spTree>
+  </p:cSld>
+  <p:clrMapOvr>
+    <a:masterClrMapping/>
+  </p:clrMapOvr>
+</p:sld>
+</file>
+
+<file path=ppt/slides/slide39.xml><?xml version="1.0" encoding="utf-8"?>
+<p:sld xmlns:a="http://schemas.openxmlformats.org/drawingml/2006/main" xmlns:r="http://schemas.openxmlformats.org/officeDocument/2006/relationships" xmlns:mc="http://schemas.openxmlformats.org/markup-compatibility/2006" xmlns:mv="urn:schemas-microsoft-com:mac:vml" xmlns:p="http://schemas.openxmlformats.org/presentationml/2006/main" xmlns:c="http://schemas.openxmlformats.org/drawingml/2006/chart" xmlns:dgm="http://schemas.openxmlformats.org/drawingml/2006/diagram" xmlns:o="urn:schemas-microsoft-com:office:office" xmlns:v="urn:schemas-microsoft-com:vml" xmlns:pvml="urn:schemas-microsoft-com:office:powerpoint" xmlns:com="http://schemas.openxmlformats.org/drawingml/2006/compatibility" xmlns:p14="http://schemas.microsoft.com/office/powerpoint/2010/main" xmlns:p15="http://schemas.microsoft.com/office/powerpoint/2012/main" xmlns:ahyp="http://schemas.microsoft.com/office/drawing/2018/hyperlinkcolor">
+  <p:cSld>
+    <p:spTree>
+      <p:nvGrpSpPr>
+        <p:cNvPr id="331" name="Shape 331"/>
+        <p:cNvGrpSpPr/>
+        <p:nvPr/>
+      </p:nvGrpSpPr>
+      <p:grpSpPr>
+        <a:xfrm>
+          <a:off x="0" y="0"/>
+          <a:ext cx="0" cy="0"/>
+          <a:chOff x="0" y="0"/>
+          <a:chExt cx="0" cy="0"/>
+        </a:xfrm>
+      </p:grpSpPr>
+      <p:sp>
+        <p:nvSpPr>
+          <p:cNvPr id="332" name="Google Shape;332;p51"/>
           <p:cNvSpPr txBox="1"/>
           <p:nvPr>
             <p:ph type="title"/>

</xml_diff>